<commit_message>
Committing completed Main Node Application
</commit_message>
<xml_diff>
--- a/Skype_Presentation_6Nov.pptx
+++ b/Skype_Presentation_6Nov.pptx
@@ -6,12 +6,13 @@
   </p:sldMasterIdLst>
   <p:sldIdLst>
     <p:sldId id="257" r:id="rId2"/>
-    <p:sldId id="260" r:id="rId3"/>
-    <p:sldId id="259" r:id="rId4"/>
-    <p:sldId id="262" r:id="rId5"/>
-    <p:sldId id="258" r:id="rId6"/>
-    <p:sldId id="261" r:id="rId7"/>
-    <p:sldId id="263" r:id="rId8"/>
+    <p:sldId id="264" r:id="rId3"/>
+    <p:sldId id="260" r:id="rId4"/>
+    <p:sldId id="259" r:id="rId5"/>
+    <p:sldId id="262" r:id="rId6"/>
+    <p:sldId id="258" r:id="rId7"/>
+    <p:sldId id="261" r:id="rId8"/>
+    <p:sldId id="263" r:id="rId9"/>
   </p:sldIdLst>
   <p:sldSz cx="12192000" cy="6858000"/>
   <p:notesSz cx="6858000" cy="9144000"/>
@@ -110,6 +111,11 @@
       </a:defRPr>
     </a:lvl9pPr>
   </p:defaultTextStyle>
+  <p:extLst>
+    <p:ext uri="{EFAFB233-063F-42B5-8137-9DF3F51BA10A}">
+      <p15:sldGuideLst xmlns:p15="http://schemas.microsoft.com/office/powerpoint/2012/main"/>
+    </p:ext>
+  </p:extLst>
 </p:presentation>
 </file>
 
@@ -262,7 +268,7 @@
           <a:p>
             <a:fld id="{64963709-BC89-4D44-9305-C7EB0E4D1AD8}" type="datetimeFigureOut">
               <a:rPr lang="en-IN" smtClean="0"/>
-              <a:t>06-11-2019</a:t>
+              <a:t>06-12-2019</a:t>
             </a:fld>
             <a:endParaRPr lang="en-IN"/>
           </a:p>
@@ -462,7 +468,7 @@
           <a:p>
             <a:fld id="{64963709-BC89-4D44-9305-C7EB0E4D1AD8}" type="datetimeFigureOut">
               <a:rPr lang="en-IN" smtClean="0"/>
-              <a:t>06-11-2019</a:t>
+              <a:t>06-12-2019</a:t>
             </a:fld>
             <a:endParaRPr lang="en-IN"/>
           </a:p>
@@ -672,7 +678,7 @@
           <a:p>
             <a:fld id="{64963709-BC89-4D44-9305-C7EB0E4D1AD8}" type="datetimeFigureOut">
               <a:rPr lang="en-IN" smtClean="0"/>
-              <a:t>06-11-2019</a:t>
+              <a:t>06-12-2019</a:t>
             </a:fld>
             <a:endParaRPr lang="en-IN"/>
           </a:p>
@@ -872,7 +878,7 @@
           <a:p>
             <a:fld id="{64963709-BC89-4D44-9305-C7EB0E4D1AD8}" type="datetimeFigureOut">
               <a:rPr lang="en-IN" smtClean="0"/>
-              <a:t>06-11-2019</a:t>
+              <a:t>06-12-2019</a:t>
             </a:fld>
             <a:endParaRPr lang="en-IN"/>
           </a:p>
@@ -1148,7 +1154,7 @@
           <a:p>
             <a:fld id="{64963709-BC89-4D44-9305-C7EB0E4D1AD8}" type="datetimeFigureOut">
               <a:rPr lang="en-IN" smtClean="0"/>
-              <a:t>06-11-2019</a:t>
+              <a:t>06-12-2019</a:t>
             </a:fld>
             <a:endParaRPr lang="en-IN"/>
           </a:p>
@@ -1416,7 +1422,7 @@
           <a:p>
             <a:fld id="{64963709-BC89-4D44-9305-C7EB0E4D1AD8}" type="datetimeFigureOut">
               <a:rPr lang="en-IN" smtClean="0"/>
-              <a:t>06-11-2019</a:t>
+              <a:t>06-12-2019</a:t>
             </a:fld>
             <a:endParaRPr lang="en-IN"/>
           </a:p>
@@ -1831,7 +1837,7 @@
           <a:p>
             <a:fld id="{64963709-BC89-4D44-9305-C7EB0E4D1AD8}" type="datetimeFigureOut">
               <a:rPr lang="en-IN" smtClean="0"/>
-              <a:t>06-11-2019</a:t>
+              <a:t>06-12-2019</a:t>
             </a:fld>
             <a:endParaRPr lang="en-IN"/>
           </a:p>
@@ -1973,7 +1979,7 @@
           <a:p>
             <a:fld id="{64963709-BC89-4D44-9305-C7EB0E4D1AD8}" type="datetimeFigureOut">
               <a:rPr lang="en-IN" smtClean="0"/>
-              <a:t>06-11-2019</a:t>
+              <a:t>06-12-2019</a:t>
             </a:fld>
             <a:endParaRPr lang="en-IN"/>
           </a:p>
@@ -2086,7 +2092,7 @@
           <a:p>
             <a:fld id="{64963709-BC89-4D44-9305-C7EB0E4D1AD8}" type="datetimeFigureOut">
               <a:rPr lang="en-IN" smtClean="0"/>
-              <a:t>06-11-2019</a:t>
+              <a:t>06-12-2019</a:t>
             </a:fld>
             <a:endParaRPr lang="en-IN"/>
           </a:p>
@@ -2399,7 +2405,7 @@
           <a:p>
             <a:fld id="{64963709-BC89-4D44-9305-C7EB0E4D1AD8}" type="datetimeFigureOut">
               <a:rPr lang="en-IN" smtClean="0"/>
-              <a:t>06-11-2019</a:t>
+              <a:t>06-12-2019</a:t>
             </a:fld>
             <a:endParaRPr lang="en-IN"/>
           </a:p>
@@ -2688,7 +2694,7 @@
           <a:p>
             <a:fld id="{64963709-BC89-4D44-9305-C7EB0E4D1AD8}" type="datetimeFigureOut">
               <a:rPr lang="en-IN" smtClean="0"/>
-              <a:t>06-11-2019</a:t>
+              <a:t>06-12-2019</a:t>
             </a:fld>
             <a:endParaRPr lang="en-IN"/>
           </a:p>
@@ -2931,7 +2937,7 @@
           <a:p>
             <a:fld id="{64963709-BC89-4D44-9305-C7EB0E4D1AD8}" type="datetimeFigureOut">
               <a:rPr lang="en-IN" smtClean="0"/>
-              <a:t>06-11-2019</a:t>
+              <a:t>06-12-2019</a:t>
             </a:fld>
             <a:endParaRPr lang="en-IN"/>
           </a:p>
@@ -3442,6 +3448,864 @@
           <a:chExt cx="0" cy="0"/>
         </a:xfrm>
       </p:grpSpPr>
+      <p:cxnSp>
+        <p:nvCxnSpPr>
+          <p:cNvPr id="4" name="Straight Connector 3">
+            <a:extLst>
+              <a:ext uri="{FF2B5EF4-FFF2-40B4-BE49-F238E27FC236}">
+                <a16:creationId xmlns:a16="http://schemas.microsoft.com/office/drawing/2014/main" id="{D9A1F638-CF52-4869-BCB1-DBCB039915D2}"/>
+              </a:ext>
+            </a:extLst>
+          </p:cNvPr>
+          <p:cNvCxnSpPr/>
+          <p:nvPr/>
+        </p:nvCxnSpPr>
+        <p:spPr>
+          <a:xfrm>
+            <a:off x="1012054" y="1047565"/>
+            <a:ext cx="0" cy="5406501"/>
+          </a:xfrm>
+          <a:prstGeom prst="line">
+            <a:avLst/>
+          </a:prstGeom>
+        </p:spPr>
+        <p:style>
+          <a:lnRef idx="1">
+            <a:schemeClr val="accent1"/>
+          </a:lnRef>
+          <a:fillRef idx="0">
+            <a:schemeClr val="accent1"/>
+          </a:fillRef>
+          <a:effectRef idx="0">
+            <a:schemeClr val="accent1"/>
+          </a:effectRef>
+          <a:fontRef idx="minor">
+            <a:schemeClr val="tx1"/>
+          </a:fontRef>
+        </p:style>
+      </p:cxnSp>
+      <p:cxnSp>
+        <p:nvCxnSpPr>
+          <p:cNvPr id="5" name="Straight Connector 4">
+            <a:extLst>
+              <a:ext uri="{FF2B5EF4-FFF2-40B4-BE49-F238E27FC236}">
+                <a16:creationId xmlns:a16="http://schemas.microsoft.com/office/drawing/2014/main" id="{0C871283-B329-477F-9126-6AC02C1562BA}"/>
+              </a:ext>
+            </a:extLst>
+          </p:cNvPr>
+          <p:cNvCxnSpPr/>
+          <p:nvPr/>
+        </p:nvCxnSpPr>
+        <p:spPr>
+          <a:xfrm>
+            <a:off x="6233607" y="1047565"/>
+            <a:ext cx="0" cy="5406501"/>
+          </a:xfrm>
+          <a:prstGeom prst="line">
+            <a:avLst/>
+          </a:prstGeom>
+        </p:spPr>
+        <p:style>
+          <a:lnRef idx="1">
+            <a:schemeClr val="accent1"/>
+          </a:lnRef>
+          <a:fillRef idx="0">
+            <a:schemeClr val="accent1"/>
+          </a:fillRef>
+          <a:effectRef idx="0">
+            <a:schemeClr val="accent1"/>
+          </a:effectRef>
+          <a:fontRef idx="minor">
+            <a:schemeClr val="tx1"/>
+          </a:fontRef>
+        </p:style>
+      </p:cxnSp>
+      <p:cxnSp>
+        <p:nvCxnSpPr>
+          <p:cNvPr id="6" name="Straight Connector 5">
+            <a:extLst>
+              <a:ext uri="{FF2B5EF4-FFF2-40B4-BE49-F238E27FC236}">
+                <a16:creationId xmlns:a16="http://schemas.microsoft.com/office/drawing/2014/main" id="{F50B2795-7FB0-40A3-981F-35777D9DD058}"/>
+              </a:ext>
+            </a:extLst>
+          </p:cNvPr>
+          <p:cNvCxnSpPr>
+            <a:cxnSpLocks/>
+          </p:cNvCxnSpPr>
+          <p:nvPr/>
+        </p:nvCxnSpPr>
+        <p:spPr>
+          <a:xfrm>
+            <a:off x="11348625" y="839849"/>
+            <a:ext cx="0" cy="5614217"/>
+          </a:xfrm>
+          <a:prstGeom prst="line">
+            <a:avLst/>
+          </a:prstGeom>
+        </p:spPr>
+        <p:style>
+          <a:lnRef idx="1">
+            <a:schemeClr val="accent1"/>
+          </a:lnRef>
+          <a:fillRef idx="0">
+            <a:schemeClr val="accent1"/>
+          </a:fillRef>
+          <a:effectRef idx="0">
+            <a:schemeClr val="accent1"/>
+          </a:effectRef>
+          <a:fontRef idx="minor">
+            <a:schemeClr val="tx1"/>
+          </a:fontRef>
+        </p:style>
+      </p:cxnSp>
+      <p:pic>
+        <p:nvPicPr>
+          <p:cNvPr id="1026" name="Picture 2" descr="Image result for Mobile">
+            <a:extLst>
+              <a:ext uri="{FF2B5EF4-FFF2-40B4-BE49-F238E27FC236}">
+                <a16:creationId xmlns:a16="http://schemas.microsoft.com/office/drawing/2014/main" id="{192D13C8-1AB0-4EB0-9BB6-DBDAB79D600F}"/>
+              </a:ext>
+            </a:extLst>
+          </p:cNvPr>
+          <p:cNvPicPr>
+            <a:picLocks noChangeAspect="1" noChangeArrowheads="1"/>
+          </p:cNvPicPr>
+          <p:nvPr/>
+        </p:nvPicPr>
+        <p:blipFill>
+          <a:blip r:embed="rId2">
+            <a:extLst>
+              <a:ext uri="{28A0092B-C50C-407E-A947-70E740481C1C}">
+                <a14:useLocalDpi xmlns:a14="http://schemas.microsoft.com/office/drawing/2010/main" val="0"/>
+              </a:ext>
+            </a:extLst>
+          </a:blip>
+          <a:srcRect/>
+          <a:stretch>
+            <a:fillRect/>
+          </a:stretch>
+        </p:blipFill>
+        <p:spPr bwMode="auto">
+          <a:xfrm>
+            <a:off x="747406" y="195309"/>
+            <a:ext cx="529296" cy="852256"/>
+          </a:xfrm>
+          <a:prstGeom prst="rect">
+            <a:avLst/>
+          </a:prstGeom>
+          <a:noFill/>
+          <a:extLst>
+            <a:ext uri="{909E8E84-426E-40DD-AFC4-6F175D3DCCD1}">
+              <a14:hiddenFill xmlns:a14="http://schemas.microsoft.com/office/drawing/2010/main">
+                <a:solidFill>
+                  <a:srgbClr val="FFFFFF"/>
+                </a:solidFill>
+              </a14:hiddenFill>
+            </a:ext>
+          </a:extLst>
+        </p:spPr>
+      </p:pic>
+      <p:pic>
+        <p:nvPicPr>
+          <p:cNvPr id="8" name="Picture 2" descr="Image result for Mobile">
+            <a:extLst>
+              <a:ext uri="{FF2B5EF4-FFF2-40B4-BE49-F238E27FC236}">
+                <a16:creationId xmlns:a16="http://schemas.microsoft.com/office/drawing/2014/main" id="{EA6F5734-85E0-4FEC-A107-093E11B938E8}"/>
+              </a:ext>
+            </a:extLst>
+          </p:cNvPr>
+          <p:cNvPicPr>
+            <a:picLocks noChangeAspect="1" noChangeArrowheads="1"/>
+          </p:cNvPicPr>
+          <p:nvPr/>
+        </p:nvPicPr>
+        <p:blipFill>
+          <a:blip r:embed="rId2">
+            <a:extLst>
+              <a:ext uri="{28A0092B-C50C-407E-A947-70E740481C1C}">
+                <a14:useLocalDpi xmlns:a14="http://schemas.microsoft.com/office/drawing/2010/main" val="0"/>
+              </a:ext>
+            </a:extLst>
+          </a:blip>
+          <a:srcRect/>
+          <a:stretch>
+            <a:fillRect/>
+          </a:stretch>
+        </p:blipFill>
+        <p:spPr bwMode="auto">
+          <a:xfrm>
+            <a:off x="5968959" y="195309"/>
+            <a:ext cx="529296" cy="852256"/>
+          </a:xfrm>
+          <a:prstGeom prst="rect">
+            <a:avLst/>
+          </a:prstGeom>
+          <a:noFill/>
+          <a:extLst>
+            <a:ext uri="{909E8E84-426E-40DD-AFC4-6F175D3DCCD1}">
+              <a14:hiddenFill xmlns:a14="http://schemas.microsoft.com/office/drawing/2010/main">
+                <a:solidFill>
+                  <a:srgbClr val="FFFFFF"/>
+                </a:solidFill>
+              </a14:hiddenFill>
+            </a:ext>
+          </a:extLst>
+        </p:spPr>
+      </p:pic>
+      <p:sp>
+        <p:nvSpPr>
+          <p:cNvPr id="7" name="TextBox 6">
+            <a:extLst>
+              <a:ext uri="{FF2B5EF4-FFF2-40B4-BE49-F238E27FC236}">
+                <a16:creationId xmlns:a16="http://schemas.microsoft.com/office/drawing/2014/main" id="{AEBDF3D0-C6E4-4A9F-9234-09D97D5365FB}"/>
+              </a:ext>
+            </a:extLst>
+          </p:cNvPr>
+          <p:cNvSpPr txBox="1"/>
+          <p:nvPr/>
+        </p:nvSpPr>
+        <p:spPr>
+          <a:xfrm>
+            <a:off x="1276702" y="470517"/>
+            <a:ext cx="1439865" cy="369332"/>
+          </a:xfrm>
+          <a:prstGeom prst="rect">
+            <a:avLst/>
+          </a:prstGeom>
+          <a:noFill/>
+        </p:spPr>
+        <p:txBody>
+          <a:bodyPr wrap="square" rtlCol="0">
+            <a:spAutoFit/>
+          </a:bodyPr>
+          <a:lstStyle/>
+          <a:p>
+            <a:r>
+              <a:rPr lang="en-US" dirty="0"/>
+              <a:t>Peer Node A</a:t>
+            </a:r>
+            <a:endParaRPr lang="en-IN" dirty="0"/>
+          </a:p>
+        </p:txBody>
+      </p:sp>
+      <p:sp>
+        <p:nvSpPr>
+          <p:cNvPr id="11" name="TextBox 10">
+            <a:extLst>
+              <a:ext uri="{FF2B5EF4-FFF2-40B4-BE49-F238E27FC236}">
+                <a16:creationId xmlns:a16="http://schemas.microsoft.com/office/drawing/2014/main" id="{23B9998A-F37D-416C-8B07-5542A18E5097}"/>
+              </a:ext>
+            </a:extLst>
+          </p:cNvPr>
+          <p:cNvSpPr txBox="1"/>
+          <p:nvPr/>
+        </p:nvSpPr>
+        <p:spPr>
+          <a:xfrm>
+            <a:off x="6498255" y="470517"/>
+            <a:ext cx="1439865" cy="369332"/>
+          </a:xfrm>
+          <a:prstGeom prst="rect">
+            <a:avLst/>
+          </a:prstGeom>
+          <a:noFill/>
+        </p:spPr>
+        <p:txBody>
+          <a:bodyPr wrap="square" rtlCol="0">
+            <a:spAutoFit/>
+          </a:bodyPr>
+          <a:lstStyle/>
+          <a:p>
+            <a:r>
+              <a:rPr lang="en-US" dirty="0"/>
+              <a:t>Peer Node B</a:t>
+            </a:r>
+            <a:endParaRPr lang="en-IN" dirty="0"/>
+          </a:p>
+        </p:txBody>
+      </p:sp>
+      <p:pic>
+        <p:nvPicPr>
+          <p:cNvPr id="1028" name="Picture 4" descr="Image result for database image">
+            <a:extLst>
+              <a:ext uri="{FF2B5EF4-FFF2-40B4-BE49-F238E27FC236}">
+                <a16:creationId xmlns:a16="http://schemas.microsoft.com/office/drawing/2014/main" id="{686E5092-C9A6-4FF4-874F-9997D1A89143}"/>
+              </a:ext>
+            </a:extLst>
+          </p:cNvPr>
+          <p:cNvPicPr>
+            <a:picLocks noChangeAspect="1" noChangeArrowheads="1"/>
+          </p:cNvPicPr>
+          <p:nvPr/>
+        </p:nvPicPr>
+        <p:blipFill>
+          <a:blip r:embed="rId3">
+            <a:extLst>
+              <a:ext uri="{28A0092B-C50C-407E-A947-70E740481C1C}">
+                <a14:useLocalDpi xmlns:a14="http://schemas.microsoft.com/office/drawing/2010/main" val="0"/>
+              </a:ext>
+            </a:extLst>
+          </a:blip>
+          <a:srcRect/>
+          <a:stretch>
+            <a:fillRect/>
+          </a:stretch>
+        </p:blipFill>
+        <p:spPr bwMode="auto">
+          <a:xfrm>
+            <a:off x="11083977" y="354942"/>
+            <a:ext cx="529296" cy="529296"/>
+          </a:xfrm>
+          <a:prstGeom prst="rect">
+            <a:avLst/>
+          </a:prstGeom>
+          <a:noFill/>
+          <a:extLst>
+            <a:ext uri="{909E8E84-426E-40DD-AFC4-6F175D3DCCD1}">
+              <a14:hiddenFill xmlns:a14="http://schemas.microsoft.com/office/drawing/2010/main">
+                <a:solidFill>
+                  <a:srgbClr val="FFFFFF"/>
+                </a:solidFill>
+              </a14:hiddenFill>
+            </a:ext>
+          </a:extLst>
+        </p:spPr>
+      </p:pic>
+      <p:sp>
+        <p:nvSpPr>
+          <p:cNvPr id="10" name="TextBox 9">
+            <a:extLst>
+              <a:ext uri="{FF2B5EF4-FFF2-40B4-BE49-F238E27FC236}">
+                <a16:creationId xmlns:a16="http://schemas.microsoft.com/office/drawing/2014/main" id="{5070945E-F860-451F-A6B3-59394C6AAF8B}"/>
+              </a:ext>
+            </a:extLst>
+          </p:cNvPr>
+          <p:cNvSpPr txBox="1"/>
+          <p:nvPr/>
+        </p:nvSpPr>
+        <p:spPr>
+          <a:xfrm>
+            <a:off x="9863091" y="470517"/>
+            <a:ext cx="1052197" cy="369332"/>
+          </a:xfrm>
+          <a:prstGeom prst="rect">
+            <a:avLst/>
+          </a:prstGeom>
+          <a:noFill/>
+        </p:spPr>
+        <p:txBody>
+          <a:bodyPr wrap="square" rtlCol="0">
+            <a:spAutoFit/>
+          </a:bodyPr>
+          <a:lstStyle/>
+          <a:p>
+            <a:r>
+              <a:rPr lang="en-US" dirty="0"/>
+              <a:t>Database</a:t>
+            </a:r>
+            <a:endParaRPr lang="en-IN" dirty="0"/>
+          </a:p>
+        </p:txBody>
+      </p:sp>
+      <p:cxnSp>
+        <p:nvCxnSpPr>
+          <p:cNvPr id="19" name="Straight Arrow Connector 18">
+            <a:extLst>
+              <a:ext uri="{FF2B5EF4-FFF2-40B4-BE49-F238E27FC236}">
+                <a16:creationId xmlns:a16="http://schemas.microsoft.com/office/drawing/2014/main" id="{9A7870E8-5CA9-4C4B-A737-17617D69074E}"/>
+              </a:ext>
+            </a:extLst>
+          </p:cNvPr>
+          <p:cNvCxnSpPr/>
+          <p:nvPr/>
+        </p:nvCxnSpPr>
+        <p:spPr>
+          <a:xfrm flipH="1">
+            <a:off x="6233607" y="1358280"/>
+            <a:ext cx="5115018" cy="0"/>
+          </a:xfrm>
+          <a:prstGeom prst="straightConnector1">
+            <a:avLst/>
+          </a:prstGeom>
+          <a:ln>
+            <a:tailEnd type="triangle"/>
+          </a:ln>
+        </p:spPr>
+        <p:style>
+          <a:lnRef idx="1">
+            <a:schemeClr val="accent1"/>
+          </a:lnRef>
+          <a:fillRef idx="0">
+            <a:schemeClr val="accent1"/>
+          </a:fillRef>
+          <a:effectRef idx="0">
+            <a:schemeClr val="accent1"/>
+          </a:effectRef>
+          <a:fontRef idx="minor">
+            <a:schemeClr val="tx1"/>
+          </a:fontRef>
+        </p:style>
+      </p:cxnSp>
+      <p:sp>
+        <p:nvSpPr>
+          <p:cNvPr id="20" name="TextBox 19">
+            <a:extLst>
+              <a:ext uri="{FF2B5EF4-FFF2-40B4-BE49-F238E27FC236}">
+                <a16:creationId xmlns:a16="http://schemas.microsoft.com/office/drawing/2014/main" id="{DE752D78-4DBA-4D0D-8BFC-FC79DDF1DEA2}"/>
+              </a:ext>
+            </a:extLst>
+          </p:cNvPr>
+          <p:cNvSpPr txBox="1"/>
+          <p:nvPr/>
+        </p:nvSpPr>
+        <p:spPr>
+          <a:xfrm>
+            <a:off x="6402297" y="1052918"/>
+            <a:ext cx="4788213" cy="307777"/>
+          </a:xfrm>
+          <a:prstGeom prst="rect">
+            <a:avLst/>
+          </a:prstGeom>
+          <a:noFill/>
+        </p:spPr>
+        <p:txBody>
+          <a:bodyPr wrap="square" rtlCol="0">
+            <a:spAutoFit/>
+          </a:bodyPr>
+          <a:lstStyle/>
+          <a:p>
+            <a:r>
+              <a:rPr lang="en-US" sz="1400" dirty="0"/>
+              <a:t>Latest Hash from the database is updated to the Peer Node</a:t>
+            </a:r>
+            <a:endParaRPr lang="en-IN" sz="1400" dirty="0"/>
+          </a:p>
+        </p:txBody>
+      </p:sp>
+      <p:pic>
+        <p:nvPicPr>
+          <p:cNvPr id="1030" name="Picture 6" descr="Image result for array">
+            <a:extLst>
+              <a:ext uri="{FF2B5EF4-FFF2-40B4-BE49-F238E27FC236}">
+                <a16:creationId xmlns:a16="http://schemas.microsoft.com/office/drawing/2014/main" id="{B379329B-3DE8-40C8-AD7D-6095B5AB1911}"/>
+              </a:ext>
+            </a:extLst>
+          </p:cNvPr>
+          <p:cNvPicPr>
+            <a:picLocks noChangeAspect="1" noChangeArrowheads="1"/>
+          </p:cNvPicPr>
+          <p:nvPr/>
+        </p:nvPicPr>
+        <p:blipFill>
+          <a:blip r:embed="rId4">
+            <a:extLst>
+              <a:ext uri="{28A0092B-C50C-407E-A947-70E740481C1C}">
+                <a14:useLocalDpi xmlns:a14="http://schemas.microsoft.com/office/drawing/2010/main" val="0"/>
+              </a:ext>
+            </a:extLst>
+          </a:blip>
+          <a:srcRect/>
+          <a:stretch>
+            <a:fillRect/>
+          </a:stretch>
+        </p:blipFill>
+        <p:spPr bwMode="auto">
+          <a:xfrm>
+            <a:off x="8323748" y="1407443"/>
+            <a:ext cx="934736" cy="424880"/>
+          </a:xfrm>
+          <a:prstGeom prst="rect">
+            <a:avLst/>
+          </a:prstGeom>
+          <a:noFill/>
+          <a:extLst>
+            <a:ext uri="{909E8E84-426E-40DD-AFC4-6F175D3DCCD1}">
+              <a14:hiddenFill xmlns:a14="http://schemas.microsoft.com/office/drawing/2010/main">
+                <a:solidFill>
+                  <a:srgbClr val="FFFFFF"/>
+                </a:solidFill>
+              </a14:hiddenFill>
+            </a:ext>
+          </a:extLst>
+        </p:spPr>
+      </p:pic>
+      <p:cxnSp>
+        <p:nvCxnSpPr>
+          <p:cNvPr id="24" name="Straight Arrow Connector 23">
+            <a:extLst>
+              <a:ext uri="{FF2B5EF4-FFF2-40B4-BE49-F238E27FC236}">
+                <a16:creationId xmlns:a16="http://schemas.microsoft.com/office/drawing/2014/main" id="{0A91098D-9F01-4999-8AA8-0BDAF3C30AED}"/>
+              </a:ext>
+            </a:extLst>
+          </p:cNvPr>
+          <p:cNvCxnSpPr/>
+          <p:nvPr/>
+        </p:nvCxnSpPr>
+        <p:spPr>
+          <a:xfrm>
+            <a:off x="1012054" y="1704513"/>
+            <a:ext cx="5221553" cy="0"/>
+          </a:xfrm>
+          <a:prstGeom prst="straightConnector1">
+            <a:avLst/>
+          </a:prstGeom>
+          <a:ln>
+            <a:tailEnd type="triangle"/>
+          </a:ln>
+        </p:spPr>
+        <p:style>
+          <a:lnRef idx="1">
+            <a:schemeClr val="accent1"/>
+          </a:lnRef>
+          <a:fillRef idx="0">
+            <a:schemeClr val="accent1"/>
+          </a:fillRef>
+          <a:effectRef idx="0">
+            <a:schemeClr val="accent1"/>
+          </a:effectRef>
+          <a:fontRef idx="minor">
+            <a:schemeClr val="tx1"/>
+          </a:fontRef>
+        </p:style>
+      </p:cxnSp>
+      <p:sp>
+        <p:nvSpPr>
+          <p:cNvPr id="25" name="TextBox 24">
+            <a:extLst>
+              <a:ext uri="{FF2B5EF4-FFF2-40B4-BE49-F238E27FC236}">
+                <a16:creationId xmlns:a16="http://schemas.microsoft.com/office/drawing/2014/main" id="{A2D11D4D-C664-4BA4-B14B-4DE21D7A54C6}"/>
+              </a:ext>
+            </a:extLst>
+          </p:cNvPr>
+          <p:cNvSpPr txBox="1"/>
+          <p:nvPr/>
+        </p:nvSpPr>
+        <p:spPr>
+          <a:xfrm>
+            <a:off x="1145219" y="1287262"/>
+            <a:ext cx="4823736" cy="307777"/>
+          </a:xfrm>
+          <a:prstGeom prst="rect">
+            <a:avLst/>
+          </a:prstGeom>
+          <a:noFill/>
+        </p:spPr>
+        <p:txBody>
+          <a:bodyPr wrap="square" rtlCol="0">
+            <a:spAutoFit/>
+          </a:bodyPr>
+          <a:lstStyle/>
+          <a:p>
+            <a:r>
+              <a:rPr lang="en-US" sz="1400" dirty="0"/>
+              <a:t>Opens Blockchain app to read QR Code</a:t>
+            </a:r>
+            <a:endParaRPr lang="en-IN" sz="1400" dirty="0"/>
+          </a:p>
+        </p:txBody>
+      </p:sp>
+      <p:pic>
+        <p:nvPicPr>
+          <p:cNvPr id="1032" name="Picture 8" descr="Image result for qr code">
+            <a:extLst>
+              <a:ext uri="{FF2B5EF4-FFF2-40B4-BE49-F238E27FC236}">
+                <a16:creationId xmlns:a16="http://schemas.microsoft.com/office/drawing/2014/main" id="{76BDA3B9-BA10-4425-9026-114A28358C93}"/>
+              </a:ext>
+            </a:extLst>
+          </p:cNvPr>
+          <p:cNvPicPr>
+            <a:picLocks noChangeAspect="1" noChangeArrowheads="1"/>
+          </p:cNvPicPr>
+          <p:nvPr/>
+        </p:nvPicPr>
+        <p:blipFill>
+          <a:blip r:embed="rId5">
+            <a:extLst>
+              <a:ext uri="{28A0092B-C50C-407E-A947-70E740481C1C}">
+                <a14:useLocalDpi xmlns:a14="http://schemas.microsoft.com/office/drawing/2010/main" val="0"/>
+              </a:ext>
+            </a:extLst>
+          </a:blip>
+          <a:srcRect/>
+          <a:stretch>
+            <a:fillRect/>
+          </a:stretch>
+        </p:blipFill>
+        <p:spPr bwMode="auto">
+          <a:xfrm>
+            <a:off x="4143466" y="1072832"/>
+            <a:ext cx="599302" cy="599302"/>
+          </a:xfrm>
+          <a:prstGeom prst="rect">
+            <a:avLst/>
+          </a:prstGeom>
+          <a:noFill/>
+          <a:extLst>
+            <a:ext uri="{909E8E84-426E-40DD-AFC4-6F175D3DCCD1}">
+              <a14:hiddenFill xmlns:a14="http://schemas.microsoft.com/office/drawing/2010/main">
+                <a:solidFill>
+                  <a:srgbClr val="FFFFFF"/>
+                </a:solidFill>
+              </a14:hiddenFill>
+            </a:ext>
+          </a:extLst>
+        </p:spPr>
+      </p:pic>
+      <p:cxnSp>
+        <p:nvCxnSpPr>
+          <p:cNvPr id="27" name="Straight Arrow Connector 26">
+            <a:extLst>
+              <a:ext uri="{FF2B5EF4-FFF2-40B4-BE49-F238E27FC236}">
+                <a16:creationId xmlns:a16="http://schemas.microsoft.com/office/drawing/2014/main" id="{07AC1073-F250-407A-870B-A20DD56D02B0}"/>
+              </a:ext>
+            </a:extLst>
+          </p:cNvPr>
+          <p:cNvCxnSpPr/>
+          <p:nvPr/>
+        </p:nvCxnSpPr>
+        <p:spPr>
+          <a:xfrm flipH="1">
+            <a:off x="1012054" y="2112885"/>
+            <a:ext cx="5221553" cy="0"/>
+          </a:xfrm>
+          <a:prstGeom prst="straightConnector1">
+            <a:avLst/>
+          </a:prstGeom>
+          <a:ln>
+            <a:tailEnd type="triangle"/>
+          </a:ln>
+        </p:spPr>
+        <p:style>
+          <a:lnRef idx="1">
+            <a:schemeClr val="accent1"/>
+          </a:lnRef>
+          <a:fillRef idx="0">
+            <a:schemeClr val="accent1"/>
+          </a:fillRef>
+          <a:effectRef idx="0">
+            <a:schemeClr val="accent1"/>
+          </a:effectRef>
+          <a:fontRef idx="minor">
+            <a:schemeClr val="tx1"/>
+          </a:fontRef>
+        </p:style>
+      </p:cxnSp>
+      <p:sp>
+        <p:nvSpPr>
+          <p:cNvPr id="28" name="TextBox 27">
+            <a:extLst>
+              <a:ext uri="{FF2B5EF4-FFF2-40B4-BE49-F238E27FC236}">
+                <a16:creationId xmlns:a16="http://schemas.microsoft.com/office/drawing/2014/main" id="{6BB36C6F-3E8B-49CA-966C-EBF6A5681D1A}"/>
+              </a:ext>
+            </a:extLst>
+          </p:cNvPr>
+          <p:cNvSpPr txBox="1"/>
+          <p:nvPr/>
+        </p:nvSpPr>
+        <p:spPr>
+          <a:xfrm>
+            <a:off x="1145219" y="1759245"/>
+            <a:ext cx="4950779" cy="307777"/>
+          </a:xfrm>
+          <a:prstGeom prst="rect">
+            <a:avLst/>
+          </a:prstGeom>
+          <a:noFill/>
+        </p:spPr>
+        <p:txBody>
+          <a:bodyPr wrap="square" rtlCol="0">
+            <a:spAutoFit/>
+          </a:bodyPr>
+          <a:lstStyle/>
+          <a:p>
+            <a:r>
+              <a:rPr lang="en-US" sz="1400" dirty="0"/>
+              <a:t>QR Code is read and returned to the Peer Node A</a:t>
+            </a:r>
+            <a:endParaRPr lang="en-IN" sz="1400" dirty="0"/>
+          </a:p>
+        </p:txBody>
+      </p:sp>
+      <p:cxnSp>
+        <p:nvCxnSpPr>
+          <p:cNvPr id="30" name="Straight Arrow Connector 29">
+            <a:extLst>
+              <a:ext uri="{FF2B5EF4-FFF2-40B4-BE49-F238E27FC236}">
+                <a16:creationId xmlns:a16="http://schemas.microsoft.com/office/drawing/2014/main" id="{5AB888A0-26A0-4A87-B821-CA4BFD9D03C6}"/>
+              </a:ext>
+            </a:extLst>
+          </p:cNvPr>
+          <p:cNvCxnSpPr/>
+          <p:nvPr/>
+        </p:nvCxnSpPr>
+        <p:spPr>
+          <a:xfrm>
+            <a:off x="1012054" y="3646957"/>
+            <a:ext cx="5221553" cy="0"/>
+          </a:xfrm>
+          <a:prstGeom prst="straightConnector1">
+            <a:avLst/>
+          </a:prstGeom>
+          <a:ln>
+            <a:tailEnd type="triangle"/>
+          </a:ln>
+        </p:spPr>
+        <p:style>
+          <a:lnRef idx="1">
+            <a:schemeClr val="accent1"/>
+          </a:lnRef>
+          <a:fillRef idx="0">
+            <a:schemeClr val="accent1"/>
+          </a:fillRef>
+          <a:effectRef idx="0">
+            <a:schemeClr val="accent1"/>
+          </a:effectRef>
+          <a:fontRef idx="minor">
+            <a:schemeClr val="tx1"/>
+          </a:fontRef>
+        </p:style>
+      </p:cxnSp>
+      <p:sp>
+        <p:nvSpPr>
+          <p:cNvPr id="31" name="TextBox 30">
+            <a:extLst>
+              <a:ext uri="{FF2B5EF4-FFF2-40B4-BE49-F238E27FC236}">
+                <a16:creationId xmlns:a16="http://schemas.microsoft.com/office/drawing/2014/main" id="{09F01464-FDC8-457A-9AFF-4839B2380062}"/>
+              </a:ext>
+            </a:extLst>
+          </p:cNvPr>
+          <p:cNvSpPr txBox="1"/>
+          <p:nvPr/>
+        </p:nvSpPr>
+        <p:spPr>
+          <a:xfrm>
+            <a:off x="1118590" y="2349268"/>
+            <a:ext cx="4919692" cy="1169551"/>
+          </a:xfrm>
+          <a:prstGeom prst="rect">
+            <a:avLst/>
+          </a:prstGeom>
+          <a:noFill/>
+        </p:spPr>
+        <p:txBody>
+          <a:bodyPr wrap="square" rtlCol="0">
+            <a:spAutoFit/>
+          </a:bodyPr>
+          <a:lstStyle/>
+          <a:p>
+            <a:r>
+              <a:rPr lang="en-US" sz="1400" dirty="0"/>
+              <a:t>Peer Node A verifies the QR Code against the Hash of the latest block. In this case, if the Hash encoded in the QR Code matches that of the latest block’s hash, then the Peer Node B is notified that the Hash is correct and the notification has a key as well as the entire block to unlock the second stage of the Application.</a:t>
+            </a:r>
+            <a:endParaRPr lang="en-IN" sz="1400" dirty="0"/>
+          </a:p>
+        </p:txBody>
+      </p:sp>
+      <p:cxnSp>
+        <p:nvCxnSpPr>
+          <p:cNvPr id="1025" name="Straight Arrow Connector 1024">
+            <a:extLst>
+              <a:ext uri="{FF2B5EF4-FFF2-40B4-BE49-F238E27FC236}">
+                <a16:creationId xmlns:a16="http://schemas.microsoft.com/office/drawing/2014/main" id="{73A0E41B-F606-4B5B-BD15-FF31C414D5B9}"/>
+              </a:ext>
+            </a:extLst>
+          </p:cNvPr>
+          <p:cNvCxnSpPr/>
+          <p:nvPr/>
+        </p:nvCxnSpPr>
+        <p:spPr>
+          <a:xfrm>
+            <a:off x="1012054" y="4323419"/>
+            <a:ext cx="10336571" cy="0"/>
+          </a:xfrm>
+          <a:prstGeom prst="straightConnector1">
+            <a:avLst/>
+          </a:prstGeom>
+          <a:ln>
+            <a:tailEnd type="triangle"/>
+          </a:ln>
+        </p:spPr>
+        <p:style>
+          <a:lnRef idx="1">
+            <a:schemeClr val="accent1"/>
+          </a:lnRef>
+          <a:fillRef idx="0">
+            <a:schemeClr val="accent1"/>
+          </a:fillRef>
+          <a:effectRef idx="0">
+            <a:schemeClr val="accent1"/>
+          </a:effectRef>
+          <a:fontRef idx="minor">
+            <a:schemeClr val="tx1"/>
+          </a:fontRef>
+        </p:style>
+      </p:cxnSp>
+      <p:sp>
+        <p:nvSpPr>
+          <p:cNvPr id="1027" name="TextBox 1026">
+            <a:extLst>
+              <a:ext uri="{FF2B5EF4-FFF2-40B4-BE49-F238E27FC236}">
+                <a16:creationId xmlns:a16="http://schemas.microsoft.com/office/drawing/2014/main" id="{45880197-DC08-48E3-AD19-E5A64DE788C7}"/>
+              </a:ext>
+            </a:extLst>
+          </p:cNvPr>
+          <p:cNvSpPr txBox="1"/>
+          <p:nvPr/>
+        </p:nvSpPr>
+        <p:spPr>
+          <a:xfrm>
+            <a:off x="1078636" y="3795759"/>
+            <a:ext cx="10034723" cy="523220"/>
+          </a:xfrm>
+          <a:prstGeom prst="rect">
+            <a:avLst/>
+          </a:prstGeom>
+          <a:noFill/>
+        </p:spPr>
+        <p:txBody>
+          <a:bodyPr wrap="square" rtlCol="0">
+            <a:spAutoFit/>
+          </a:bodyPr>
+          <a:lstStyle/>
+          <a:p>
+            <a:r>
+              <a:rPr lang="en-US" sz="1400" dirty="0"/>
+              <a:t>The latest block’s hash are sent to the Database so that the next few nodes can update their QR Codes to that containing the corresponding Hash</a:t>
+            </a:r>
+            <a:endParaRPr lang="en-IN" sz="1400" dirty="0"/>
+          </a:p>
+        </p:txBody>
+      </p:sp>
+    </p:spTree>
+    <p:extLst>
+      <p:ext uri="{BB962C8B-B14F-4D97-AF65-F5344CB8AC3E}">
+        <p14:creationId xmlns:p14="http://schemas.microsoft.com/office/powerpoint/2010/main" val="1526350310"/>
+      </p:ext>
+    </p:extLst>
+  </p:cSld>
+  <p:clrMapOvr>
+    <a:masterClrMapping/>
+  </p:clrMapOvr>
+</p:sld>
+</file>
+
+<file path=ppt/slides/slide3.xml><?xml version="1.0" encoding="utf-8"?>
+<p:sld xmlns:a="http://schemas.openxmlformats.org/drawingml/2006/main" xmlns:r="http://schemas.openxmlformats.org/officeDocument/2006/relationships" xmlns:p="http://schemas.openxmlformats.org/presentationml/2006/main">
+  <p:cSld>
+    <p:spTree>
+      <p:nvGrpSpPr>
+        <p:cNvPr id="1" name=""/>
+        <p:cNvGrpSpPr/>
+        <p:nvPr/>
+      </p:nvGrpSpPr>
+      <p:grpSpPr>
+        <a:xfrm>
+          <a:off x="0" y="0"/>
+          <a:ext cx="0" cy="0"/>
+          <a:chOff x="0" y="0"/>
+          <a:chExt cx="0" cy="0"/>
+        </a:xfrm>
+      </p:grpSpPr>
       <p:sp>
         <p:nvSpPr>
           <p:cNvPr id="2" name="Title 1">
@@ -3533,7 +4397,7 @@
 </p:sld>
 </file>
 
-<file path=ppt/slides/slide3.xml><?xml version="1.0" encoding="utf-8"?>
+<file path=ppt/slides/slide4.xml><?xml version="1.0" encoding="utf-8"?>
 <p:sld xmlns:a="http://schemas.openxmlformats.org/drawingml/2006/main" xmlns:r="http://schemas.openxmlformats.org/officeDocument/2006/relationships" xmlns:p="http://schemas.openxmlformats.org/presentationml/2006/main">
   <p:cSld>
     <p:spTree>
@@ -3627,7 +4491,7 @@
 </p:sld>
 </file>
 
-<file path=ppt/slides/slide4.xml><?xml version="1.0" encoding="utf-8"?>
+<file path=ppt/slides/slide5.xml><?xml version="1.0" encoding="utf-8"?>
 <p:sld xmlns:a="http://schemas.openxmlformats.org/drawingml/2006/main" xmlns:r="http://schemas.openxmlformats.org/officeDocument/2006/relationships" xmlns:p="http://schemas.openxmlformats.org/presentationml/2006/main">
   <p:cSld>
     <p:spTree>
@@ -3751,7 +4615,7 @@
 </p:sld>
 </file>
 
-<file path=ppt/slides/slide5.xml><?xml version="1.0" encoding="utf-8"?>
+<file path=ppt/slides/slide6.xml><?xml version="1.0" encoding="utf-8"?>
 <p:sld xmlns:a="http://schemas.openxmlformats.org/drawingml/2006/main" xmlns:r="http://schemas.openxmlformats.org/officeDocument/2006/relationships" xmlns:p="http://schemas.openxmlformats.org/presentationml/2006/main">
   <p:cSld>
     <p:spTree>
@@ -3845,7 +4709,7 @@
 </p:sld>
 </file>
 
-<file path=ppt/slides/slide6.xml><?xml version="1.0" encoding="utf-8"?>
+<file path=ppt/slides/slide7.xml><?xml version="1.0" encoding="utf-8"?>
 <p:sld xmlns:a="http://schemas.openxmlformats.org/drawingml/2006/main" xmlns:r="http://schemas.openxmlformats.org/officeDocument/2006/relationships" xmlns:p="http://schemas.openxmlformats.org/presentationml/2006/main">
   <p:cSld>
     <p:spTree>
@@ -3963,7 +4827,7 @@
 </p:sld>
 </file>
 
-<file path=ppt/slides/slide7.xml><?xml version="1.0" encoding="utf-8"?>
+<file path=ppt/slides/slide8.xml><?xml version="1.0" encoding="utf-8"?>
 <p:sld xmlns:a="http://schemas.openxmlformats.org/drawingml/2006/main" xmlns:r="http://schemas.openxmlformats.org/officeDocument/2006/relationships" xmlns:p="http://schemas.openxmlformats.org/presentationml/2006/main">
   <p:cSld>
     <p:spTree>

</xml_diff>